<commit_message>
Publish version 1.0 w/ description doc
</commit_message>
<xml_diff>
--- a/IPS.pptx
+++ b/IPS.pptx
@@ -6,6 +6,7 @@
   </p:sldMasterIdLst>
   <p:sldIdLst>
     <p:sldId id="256" r:id="rId2"/>
+    <p:sldId id="257" r:id="rId3"/>
   </p:sldIdLst>
   <p:sldSz cx="12192000" cy="6858000"/>
   <p:notesSz cx="6858000" cy="9144000"/>
@@ -104,19 +105,287 @@
       </a:defRPr>
     </a:lvl9pPr>
   </p:defaultTextStyle>
+  <p:extLst>
+    <p:ext uri="{EFAFB233-063F-42B5-8137-9DF3F51BA10A}">
+      <p15:sldGuideLst xmlns:p15="http://schemas.microsoft.com/office/powerpoint/2012/main"/>
+    </p:ext>
+  </p:extLst>
 </p:presentation>
 </file>
 
 <file path=ppt/revisionInfo.xml><?xml version="1.0" encoding="utf-8"?>
 <p1510:revInfo xmlns:a="http://schemas.openxmlformats.org/drawingml/2006/main" xmlns:r="http://schemas.openxmlformats.org/officeDocument/2006/relationships" xmlns:p1510="http://schemas.microsoft.com/office/powerpoint/2015/10/main">
   <p1510:revLst>
-    <p1510:client id="{E6B8DBC5-191B-48A8-A357-BAFF85B7CFB4}" v="3" dt="2021-04-16T18:41:26.535"/>
+    <p1510:client id="{B5C1083E-39BF-411A-973B-3051B774A021}" v="3" dt="2021-04-28T14:27:00.845"/>
   </p1510:revLst>
 </p1510:revInfo>
 </file>
 
 <file path=ppt/changesInfos/changesInfo1.xml><?xml version="1.0" encoding="utf-8"?>
 <pc:chgInfo xmlns:a="http://schemas.openxmlformats.org/drawingml/2006/main" xmlns:r="http://schemas.openxmlformats.org/officeDocument/2006/relationships" xmlns:ac="http://schemas.microsoft.com/office/drawing/2013/main/command" xmlns:pc="http://schemas.microsoft.com/office/powerpoint/2013/main/command">
+  <pc:docChgLst>
+    <pc:chgData name="Rick McAlister" userId="fad37fcb1da1ebec" providerId="LiveId" clId="{B5C1083E-39BF-411A-973B-3051B774A021}"/>
+    <pc:docChg chg="undo custSel addSld modSld">
+      <pc:chgData name="Rick McAlister" userId="fad37fcb1da1ebec" providerId="LiveId" clId="{B5C1083E-39BF-411A-973B-3051B774A021}" dt="2021-04-28T15:15:32.056" v="79" actId="1076"/>
+      <pc:docMkLst>
+        <pc:docMk/>
+      </pc:docMkLst>
+      <pc:sldChg chg="addSp modSp mod">
+        <pc:chgData name="Rick McAlister" userId="fad37fcb1da1ebec" providerId="LiveId" clId="{B5C1083E-39BF-411A-973B-3051B774A021}" dt="2021-04-28T14:51:43.594" v="75" actId="167"/>
+        <pc:sldMkLst>
+          <pc:docMk/>
+          <pc:sldMk cId="2168399988" sldId="256"/>
+        </pc:sldMkLst>
+        <pc:spChg chg="mod">
+          <ac:chgData name="Rick McAlister" userId="fad37fcb1da1ebec" providerId="LiveId" clId="{B5C1083E-39BF-411A-973B-3051B774A021}" dt="2021-04-28T14:27:58.350" v="60" actId="1076"/>
+          <ac:spMkLst>
+            <pc:docMk/>
+            <pc:sldMk cId="2168399988" sldId="256"/>
+            <ac:spMk id="4" creationId="{07BABCFB-18DF-409E-8686-0DCF8CF0926D}"/>
+          </ac:spMkLst>
+        </pc:spChg>
+        <pc:spChg chg="mod">
+          <ac:chgData name="Rick McAlister" userId="fad37fcb1da1ebec" providerId="LiveId" clId="{B5C1083E-39BF-411A-973B-3051B774A021}" dt="2021-04-28T14:26:58.143" v="56" actId="1076"/>
+          <ac:spMkLst>
+            <pc:docMk/>
+            <pc:sldMk cId="2168399988" sldId="256"/>
+            <ac:spMk id="5" creationId="{B84A7159-DF70-48AF-A90F-5DE6A89E048B}"/>
+          </ac:spMkLst>
+        </pc:spChg>
+        <pc:spChg chg="mod">
+          <ac:chgData name="Rick McAlister" userId="fad37fcb1da1ebec" providerId="LiveId" clId="{B5C1083E-39BF-411A-973B-3051B774A021}" dt="2021-04-28T14:26:58.143" v="56" actId="1076"/>
+          <ac:spMkLst>
+            <pc:docMk/>
+            <pc:sldMk cId="2168399988" sldId="256"/>
+            <ac:spMk id="6" creationId="{8FF31F17-8750-4379-B248-62B955EA87C2}"/>
+          </ac:spMkLst>
+        </pc:spChg>
+        <pc:spChg chg="mod">
+          <ac:chgData name="Rick McAlister" userId="fad37fcb1da1ebec" providerId="LiveId" clId="{B5C1083E-39BF-411A-973B-3051B774A021}" dt="2021-04-28T14:27:35.904" v="59" actId="207"/>
+          <ac:spMkLst>
+            <pc:docMk/>
+            <pc:sldMk cId="2168399988" sldId="256"/>
+            <ac:spMk id="8" creationId="{5F2ADC18-E36C-4667-91DE-585F86CC7DF3}"/>
+          </ac:spMkLst>
+        </pc:spChg>
+        <pc:spChg chg="mod">
+          <ac:chgData name="Rick McAlister" userId="fad37fcb1da1ebec" providerId="LiveId" clId="{B5C1083E-39BF-411A-973B-3051B774A021}" dt="2021-04-28T14:27:58.350" v="60" actId="1076"/>
+          <ac:spMkLst>
+            <pc:docMk/>
+            <pc:sldMk cId="2168399988" sldId="256"/>
+            <ac:spMk id="9" creationId="{DA8E07AF-FF9E-4332-ABE9-8C25D25D8670}"/>
+          </ac:spMkLst>
+        </pc:spChg>
+        <pc:spChg chg="mod">
+          <ac:chgData name="Rick McAlister" userId="fad37fcb1da1ebec" providerId="LiveId" clId="{B5C1083E-39BF-411A-973B-3051B774A021}" dt="2021-04-28T14:27:58.350" v="60" actId="1076"/>
+          <ac:spMkLst>
+            <pc:docMk/>
+            <pc:sldMk cId="2168399988" sldId="256"/>
+            <ac:spMk id="10" creationId="{423EB3C8-DDFF-48F7-AA6F-5162B4695F58}"/>
+          </ac:spMkLst>
+        </pc:spChg>
+        <pc:spChg chg="mod">
+          <ac:chgData name="Rick McAlister" userId="fad37fcb1da1ebec" providerId="LiveId" clId="{B5C1083E-39BF-411A-973B-3051B774A021}" dt="2021-04-28T14:27:58.350" v="60" actId="1076"/>
+          <ac:spMkLst>
+            <pc:docMk/>
+            <pc:sldMk cId="2168399988" sldId="256"/>
+            <ac:spMk id="11" creationId="{F61D3046-6FFB-49F7-B0D4-D3A1CE7F6983}"/>
+          </ac:spMkLst>
+        </pc:spChg>
+        <pc:spChg chg="mod ord">
+          <ac:chgData name="Rick McAlister" userId="fad37fcb1da1ebec" providerId="LiveId" clId="{B5C1083E-39BF-411A-973B-3051B774A021}" dt="2021-04-28T14:51:43.594" v="75" actId="167"/>
+          <ac:spMkLst>
+            <pc:docMk/>
+            <pc:sldMk cId="2168399988" sldId="256"/>
+            <ac:spMk id="12" creationId="{454C3317-54A0-4A97-9DC2-AF6421FE5B42}"/>
+          </ac:spMkLst>
+        </pc:spChg>
+        <pc:spChg chg="mod ord">
+          <ac:chgData name="Rick McAlister" userId="fad37fcb1da1ebec" providerId="LiveId" clId="{B5C1083E-39BF-411A-973B-3051B774A021}" dt="2021-04-28T14:51:43.594" v="75" actId="167"/>
+          <ac:spMkLst>
+            <pc:docMk/>
+            <pc:sldMk cId="2168399988" sldId="256"/>
+            <ac:spMk id="13" creationId="{4BB5720A-82C5-4BD5-B7FF-33485E19896E}"/>
+          </ac:spMkLst>
+        </pc:spChg>
+        <pc:spChg chg="mod">
+          <ac:chgData name="Rick McAlister" userId="fad37fcb1da1ebec" providerId="LiveId" clId="{B5C1083E-39BF-411A-973B-3051B774A021}" dt="2021-04-28T14:27:35.904" v="59" actId="207"/>
+          <ac:spMkLst>
+            <pc:docMk/>
+            <pc:sldMk cId="2168399988" sldId="256"/>
+            <ac:spMk id="14" creationId="{62F28DA4-4130-4E8E-87C5-5B279AF69ED2}"/>
+          </ac:spMkLst>
+        </pc:spChg>
+        <pc:spChg chg="mod">
+          <ac:chgData name="Rick McAlister" userId="fad37fcb1da1ebec" providerId="LiveId" clId="{B5C1083E-39BF-411A-973B-3051B774A021}" dt="2021-04-28T14:29:04.235" v="68" actId="20577"/>
+          <ac:spMkLst>
+            <pc:docMk/>
+            <pc:sldMk cId="2168399988" sldId="256"/>
+            <ac:spMk id="15" creationId="{867E03E8-31CA-470D-BAB7-F11DD786A333}"/>
+          </ac:spMkLst>
+        </pc:spChg>
+        <pc:spChg chg="mod">
+          <ac:chgData name="Rick McAlister" userId="fad37fcb1da1ebec" providerId="LiveId" clId="{B5C1083E-39BF-411A-973B-3051B774A021}" dt="2021-04-28T14:28:07.238" v="61" actId="14100"/>
+          <ac:spMkLst>
+            <pc:docMk/>
+            <pc:sldMk cId="2168399988" sldId="256"/>
+            <ac:spMk id="16" creationId="{D2757244-6A90-4F61-A2B7-076D9A53FA53}"/>
+          </ac:spMkLst>
+        </pc:spChg>
+        <pc:spChg chg="mod">
+          <ac:chgData name="Rick McAlister" userId="fad37fcb1da1ebec" providerId="LiveId" clId="{B5C1083E-39BF-411A-973B-3051B774A021}" dt="2021-04-28T14:28:07.238" v="61" actId="14100"/>
+          <ac:spMkLst>
+            <pc:docMk/>
+            <pc:sldMk cId="2168399988" sldId="256"/>
+            <ac:spMk id="17" creationId="{A051E575-169B-4FB6-9838-52409E6D5334}"/>
+          </ac:spMkLst>
+        </pc:spChg>
+        <pc:spChg chg="mod">
+          <ac:chgData name="Rick McAlister" userId="fad37fcb1da1ebec" providerId="LiveId" clId="{B5C1083E-39BF-411A-973B-3051B774A021}" dt="2021-04-28T14:28:07.238" v="61" actId="14100"/>
+          <ac:spMkLst>
+            <pc:docMk/>
+            <pc:sldMk cId="2168399988" sldId="256"/>
+            <ac:spMk id="18" creationId="{57209702-6A9C-4F7D-A9D8-51EA3358BAE2}"/>
+          </ac:spMkLst>
+        </pc:spChg>
+        <pc:spChg chg="mod">
+          <ac:chgData name="Rick McAlister" userId="fad37fcb1da1ebec" providerId="LiveId" clId="{B5C1083E-39BF-411A-973B-3051B774A021}" dt="2021-04-28T14:28:07.238" v="61" actId="14100"/>
+          <ac:spMkLst>
+            <pc:docMk/>
+            <pc:sldMk cId="2168399988" sldId="256"/>
+            <ac:spMk id="19" creationId="{BC877815-9D00-4E23-9D90-ECA0CAA8C083}"/>
+          </ac:spMkLst>
+        </pc:spChg>
+        <pc:spChg chg="add mod">
+          <ac:chgData name="Rick McAlister" userId="fad37fcb1da1ebec" providerId="LiveId" clId="{B5C1083E-39BF-411A-973B-3051B774A021}" dt="2021-04-28T14:26:51.097" v="54" actId="571"/>
+          <ac:spMkLst>
+            <pc:docMk/>
+            <pc:sldMk cId="2168399988" sldId="256"/>
+            <ac:spMk id="36" creationId="{7F455A4C-D0A9-4A7F-88FD-9C3B38D67591}"/>
+          </ac:spMkLst>
+        </pc:spChg>
+        <pc:spChg chg="add mod">
+          <ac:chgData name="Rick McAlister" userId="fad37fcb1da1ebec" providerId="LiveId" clId="{B5C1083E-39BF-411A-973B-3051B774A021}" dt="2021-04-28T14:26:51.097" v="54" actId="571"/>
+          <ac:spMkLst>
+            <pc:docMk/>
+            <pc:sldMk cId="2168399988" sldId="256"/>
+            <ac:spMk id="37" creationId="{74DA3AFB-DFB6-4A35-A522-F11AF0BA4B6A}"/>
+          </ac:spMkLst>
+        </pc:spChg>
+        <pc:spChg chg="add mod">
+          <ac:chgData name="Rick McAlister" userId="fad37fcb1da1ebec" providerId="LiveId" clId="{B5C1083E-39BF-411A-973B-3051B774A021}" dt="2021-04-28T14:27:35.904" v="59" actId="207"/>
+          <ac:spMkLst>
+            <pc:docMk/>
+            <pc:sldMk cId="2168399988" sldId="256"/>
+            <ac:spMk id="42" creationId="{51C8D325-32C1-450F-82DC-46377341B5EC}"/>
+          </ac:spMkLst>
+        </pc:spChg>
+        <pc:spChg chg="add mod">
+          <ac:chgData name="Rick McAlister" userId="fad37fcb1da1ebec" providerId="LiveId" clId="{B5C1083E-39BF-411A-973B-3051B774A021}" dt="2021-04-28T14:27:35.904" v="59" actId="207"/>
+          <ac:spMkLst>
+            <pc:docMk/>
+            <pc:sldMk cId="2168399988" sldId="256"/>
+            <ac:spMk id="43" creationId="{F112E7D8-CA3F-4099-A4CD-1F2D57049DE4}"/>
+          </ac:spMkLst>
+        </pc:spChg>
+        <pc:spChg chg="add mod">
+          <ac:chgData name="Rick McAlister" userId="fad37fcb1da1ebec" providerId="LiveId" clId="{B5C1083E-39BF-411A-973B-3051B774A021}" dt="2021-04-28T14:27:35.904" v="59" actId="207"/>
+          <ac:spMkLst>
+            <pc:docMk/>
+            <pc:sldMk cId="2168399988" sldId="256"/>
+            <ac:spMk id="44" creationId="{A54C32DD-9C13-467E-8869-47857F13E10F}"/>
+          </ac:spMkLst>
+        </pc:spChg>
+        <pc:spChg chg="mod">
+          <ac:chgData name="Rick McAlister" userId="fad37fcb1da1ebec" providerId="LiveId" clId="{B5C1083E-39BF-411A-973B-3051B774A021}" dt="2021-04-28T14:27:35.904" v="59" actId="207"/>
+          <ac:spMkLst>
+            <pc:docMk/>
+            <pc:sldMk cId="2168399988" sldId="256"/>
+            <ac:spMk id="45" creationId="{A4EA55F8-82CD-4E56-AC5A-AFEDBF839B1D}"/>
+          </ac:spMkLst>
+        </pc:spChg>
+        <pc:cxnChg chg="mod">
+          <ac:chgData name="Rick McAlister" userId="fad37fcb1da1ebec" providerId="LiveId" clId="{B5C1083E-39BF-411A-973B-3051B774A021}" dt="2021-04-28T14:26:58.143" v="56" actId="1076"/>
+          <ac:cxnSpMkLst>
+            <pc:docMk/>
+            <pc:sldMk cId="2168399988" sldId="256"/>
+            <ac:cxnSpMk id="21" creationId="{236F8A7D-87B2-415B-9CE4-8D7D448F29F4}"/>
+          </ac:cxnSpMkLst>
+        </pc:cxnChg>
+        <pc:cxnChg chg="mod">
+          <ac:chgData name="Rick McAlister" userId="fad37fcb1da1ebec" providerId="LiveId" clId="{B5C1083E-39BF-411A-973B-3051B774A021}" dt="2021-04-28T14:26:58.143" v="56" actId="1076"/>
+          <ac:cxnSpMkLst>
+            <pc:docMk/>
+            <pc:sldMk cId="2168399988" sldId="256"/>
+            <ac:cxnSpMk id="23" creationId="{0F3C60FB-82A6-4FFB-8849-24B928563845}"/>
+          </ac:cxnSpMkLst>
+        </pc:cxnChg>
+        <pc:cxnChg chg="mod">
+          <ac:chgData name="Rick McAlister" userId="fad37fcb1da1ebec" providerId="LiveId" clId="{B5C1083E-39BF-411A-973B-3051B774A021}" dt="2021-04-28T14:26:41.568" v="52" actId="1076"/>
+          <ac:cxnSpMkLst>
+            <pc:docMk/>
+            <pc:sldMk cId="2168399988" sldId="256"/>
+            <ac:cxnSpMk id="24" creationId="{99CCB015-FB69-4328-8E38-1AA91717D512}"/>
+          </ac:cxnSpMkLst>
+        </pc:cxnChg>
+        <pc:cxnChg chg="mod">
+          <ac:chgData name="Rick McAlister" userId="fad37fcb1da1ebec" providerId="LiveId" clId="{B5C1083E-39BF-411A-973B-3051B774A021}" dt="2021-04-28T14:26:41.568" v="52" actId="1076"/>
+          <ac:cxnSpMkLst>
+            <pc:docMk/>
+            <pc:sldMk cId="2168399988" sldId="256"/>
+            <ac:cxnSpMk id="25" creationId="{5F15F49C-698E-4664-B014-2DFFBD33ED7E}"/>
+          </ac:cxnSpMkLst>
+        </pc:cxnChg>
+        <pc:cxnChg chg="mod">
+          <ac:chgData name="Rick McAlister" userId="fad37fcb1da1ebec" providerId="LiveId" clId="{B5C1083E-39BF-411A-973B-3051B774A021}" dt="2021-04-28T14:26:41.568" v="52" actId="1076"/>
+          <ac:cxnSpMkLst>
+            <pc:docMk/>
+            <pc:sldMk cId="2168399988" sldId="256"/>
+            <ac:cxnSpMk id="57" creationId="{058F2672-A561-4023-8651-727A9487D9A9}"/>
+          </ac:cxnSpMkLst>
+        </pc:cxnChg>
+      </pc:sldChg>
+      <pc:sldChg chg="addSp delSp modSp new mod">
+        <pc:chgData name="Rick McAlister" userId="fad37fcb1da1ebec" providerId="LiveId" clId="{B5C1083E-39BF-411A-973B-3051B774A021}" dt="2021-04-28T15:15:32.056" v="79" actId="1076"/>
+        <pc:sldMkLst>
+          <pc:docMk/>
+          <pc:sldMk cId="369419966" sldId="257"/>
+        </pc:sldMkLst>
+        <pc:spChg chg="del">
+          <ac:chgData name="Rick McAlister" userId="fad37fcb1da1ebec" providerId="LiveId" clId="{B5C1083E-39BF-411A-973B-3051B774A021}" dt="2021-04-28T14:41:00.391" v="70" actId="478"/>
+          <ac:spMkLst>
+            <pc:docMk/>
+            <pc:sldMk cId="369419966" sldId="257"/>
+            <ac:spMk id="2" creationId="{7C11364D-F24B-4E14-A080-EA151E21E634}"/>
+          </ac:spMkLst>
+        </pc:spChg>
+        <pc:spChg chg="del">
+          <ac:chgData name="Rick McAlister" userId="fad37fcb1da1ebec" providerId="LiveId" clId="{B5C1083E-39BF-411A-973B-3051B774A021}" dt="2021-04-28T14:41:03.314" v="71" actId="478"/>
+          <ac:spMkLst>
+            <pc:docMk/>
+            <pc:sldMk cId="369419966" sldId="257"/>
+            <ac:spMk id="3" creationId="{59EE7E58-58D3-4446-983E-BD74AF93A647}"/>
+          </ac:spMkLst>
+        </pc:spChg>
+        <pc:picChg chg="add del mod">
+          <ac:chgData name="Rick McAlister" userId="fad37fcb1da1ebec" providerId="LiveId" clId="{B5C1083E-39BF-411A-973B-3051B774A021}" dt="2021-04-28T15:15:24.851" v="76" actId="478"/>
+          <ac:picMkLst>
+            <pc:docMk/>
+            <pc:sldMk cId="369419966" sldId="257"/>
+            <ac:picMk id="5" creationId="{8221C54A-1FF3-4B6D-AAF1-290BDC6C0BE6}"/>
+          </ac:picMkLst>
+        </pc:picChg>
+        <pc:picChg chg="add mod">
+          <ac:chgData name="Rick McAlister" userId="fad37fcb1da1ebec" providerId="LiveId" clId="{B5C1083E-39BF-411A-973B-3051B774A021}" dt="2021-04-28T15:15:32.056" v="79" actId="1076"/>
+          <ac:picMkLst>
+            <pc:docMk/>
+            <pc:sldMk cId="369419966" sldId="257"/>
+            <ac:picMk id="7" creationId="{7982BCF3-3518-4E4C-AEBF-B1F15687FDBE}"/>
+          </ac:picMkLst>
+        </pc:picChg>
+      </pc:sldChg>
+    </pc:docChg>
+  </pc:docChgLst>
   <pc:docChgLst>
     <pc:chgData name="Rick McAlister" userId="fad37fcb1da1ebec" providerId="LiveId" clId="{E6B8DBC5-191B-48A8-A357-BAFF85B7CFB4}"/>
     <pc:docChg chg="custSel modSld">
@@ -411,7 +680,7 @@
           <a:p>
             <a:fld id="{F3FFCF3C-4A0D-4637-8D0F-A75E6B068A0D}" type="datetimeFigureOut">
               <a:rPr lang="en-US" smtClean="0"/>
-              <a:t>4/16/2021</a:t>
+              <a:t>4/28/2021</a:t>
             </a:fld>
             <a:endParaRPr lang="en-US"/>
           </a:p>
@@ -609,7 +878,7 @@
           <a:p>
             <a:fld id="{F3FFCF3C-4A0D-4637-8D0F-A75E6B068A0D}" type="datetimeFigureOut">
               <a:rPr lang="en-US" smtClean="0"/>
-              <a:t>4/16/2021</a:t>
+              <a:t>4/28/2021</a:t>
             </a:fld>
             <a:endParaRPr lang="en-US"/>
           </a:p>
@@ -817,7 +1086,7 @@
           <a:p>
             <a:fld id="{F3FFCF3C-4A0D-4637-8D0F-A75E6B068A0D}" type="datetimeFigureOut">
               <a:rPr lang="en-US" smtClean="0"/>
-              <a:t>4/16/2021</a:t>
+              <a:t>4/28/2021</a:t>
             </a:fld>
             <a:endParaRPr lang="en-US"/>
           </a:p>
@@ -1015,7 +1284,7 @@
           <a:p>
             <a:fld id="{F3FFCF3C-4A0D-4637-8D0F-A75E6B068A0D}" type="datetimeFigureOut">
               <a:rPr lang="en-US" smtClean="0"/>
-              <a:t>4/16/2021</a:t>
+              <a:t>4/28/2021</a:t>
             </a:fld>
             <a:endParaRPr lang="en-US"/>
           </a:p>
@@ -1290,7 +1559,7 @@
           <a:p>
             <a:fld id="{F3FFCF3C-4A0D-4637-8D0F-A75E6B068A0D}" type="datetimeFigureOut">
               <a:rPr lang="en-US" smtClean="0"/>
-              <a:t>4/16/2021</a:t>
+              <a:t>4/28/2021</a:t>
             </a:fld>
             <a:endParaRPr lang="en-US"/>
           </a:p>
@@ -1555,7 +1824,7 @@
           <a:p>
             <a:fld id="{F3FFCF3C-4A0D-4637-8D0F-A75E6B068A0D}" type="datetimeFigureOut">
               <a:rPr lang="en-US" smtClean="0"/>
-              <a:t>4/16/2021</a:t>
+              <a:t>4/28/2021</a:t>
             </a:fld>
             <a:endParaRPr lang="en-US"/>
           </a:p>
@@ -1967,7 +2236,7 @@
           <a:p>
             <a:fld id="{F3FFCF3C-4A0D-4637-8D0F-A75E6B068A0D}" type="datetimeFigureOut">
               <a:rPr lang="en-US" smtClean="0"/>
-              <a:t>4/16/2021</a:t>
+              <a:t>4/28/2021</a:t>
             </a:fld>
             <a:endParaRPr lang="en-US"/>
           </a:p>
@@ -2108,7 +2377,7 @@
           <a:p>
             <a:fld id="{F3FFCF3C-4A0D-4637-8D0F-A75E6B068A0D}" type="datetimeFigureOut">
               <a:rPr lang="en-US" smtClean="0"/>
-              <a:t>4/16/2021</a:t>
+              <a:t>4/28/2021</a:t>
             </a:fld>
             <a:endParaRPr lang="en-US"/>
           </a:p>
@@ -2221,7 +2490,7 @@
           <a:p>
             <a:fld id="{F3FFCF3C-4A0D-4637-8D0F-A75E6B068A0D}" type="datetimeFigureOut">
               <a:rPr lang="en-US" smtClean="0"/>
-              <a:t>4/16/2021</a:t>
+              <a:t>4/28/2021</a:t>
             </a:fld>
             <a:endParaRPr lang="en-US"/>
           </a:p>
@@ -2532,7 +2801,7 @@
           <a:p>
             <a:fld id="{F3FFCF3C-4A0D-4637-8D0F-A75E6B068A0D}" type="datetimeFigureOut">
               <a:rPr lang="en-US" smtClean="0"/>
-              <a:t>4/16/2021</a:t>
+              <a:t>4/28/2021</a:t>
             </a:fld>
             <a:endParaRPr lang="en-US"/>
           </a:p>
@@ -2820,7 +3089,7 @@
           <a:p>
             <a:fld id="{F3FFCF3C-4A0D-4637-8D0F-A75E6B068A0D}" type="datetimeFigureOut">
               <a:rPr lang="en-US" smtClean="0"/>
-              <a:t>4/16/2021</a:t>
+              <a:t>4/28/2021</a:t>
             </a:fld>
             <a:endParaRPr lang="en-US"/>
           </a:p>
@@ -3061,7 +3330,7 @@
           <a:p>
             <a:fld id="{F3FFCF3C-4A0D-4637-8D0F-A75E6B068A0D}" type="datetimeFigureOut">
               <a:rPr lang="en-US" smtClean="0"/>
-              <a:t>4/16/2021</a:t>
+              <a:t>4/28/2021</a:t>
             </a:fld>
             <a:endParaRPr lang="en-US"/>
           </a:p>
@@ -3480,10 +3749,10 @@
       </p:grpSpPr>
       <p:sp>
         <p:nvSpPr>
-          <p:cNvPr id="4" name="Flowchart: Alternate Process 3">
-            <a:extLst>
-              <a:ext uri="{FF2B5EF4-FFF2-40B4-BE49-F238E27FC236}">
-                <a16:creationId xmlns:a16="http://schemas.microsoft.com/office/drawing/2014/main" id="{07BABCFB-18DF-409E-8686-0DCF8CF0926D}"/>
+          <p:cNvPr id="12" name="Flowchart: Process 11">
+            <a:extLst>
+              <a:ext uri="{FF2B5EF4-FFF2-40B4-BE49-F238E27FC236}">
+                <a16:creationId xmlns:a16="http://schemas.microsoft.com/office/drawing/2014/main" id="{454C3317-54A0-4A97-9DC2-AF6421FE5B42}"/>
               </a:ext>
             </a:extLst>
           </p:cNvPr>
@@ -3492,7 +3761,144 @@
         </p:nvSpPr>
         <p:spPr>
           <a:xfrm>
-            <a:off x="1071661" y="1379911"/>
+            <a:off x="3509160" y="1003466"/>
+            <a:ext cx="926640" cy="5044910"/>
+          </a:xfrm>
+          <a:prstGeom prst="flowChartProcess">
+            <a:avLst/>
+          </a:prstGeom>
+          <a:noFill/>
+          <a:ln>
+            <a:prstDash val="dash"/>
+          </a:ln>
+        </p:spPr>
+        <p:style>
+          <a:lnRef idx="2">
+            <a:schemeClr val="accent1">
+              <a:shade val="50000"/>
+            </a:schemeClr>
+          </a:lnRef>
+          <a:fillRef idx="1">
+            <a:schemeClr val="accent1"/>
+          </a:fillRef>
+          <a:effectRef idx="0">
+            <a:schemeClr val="accent1"/>
+          </a:effectRef>
+          <a:fontRef idx="minor">
+            <a:schemeClr val="lt1"/>
+          </a:fontRef>
+        </p:style>
+        <p:txBody>
+          <a:bodyPr rtlCol="0" anchor="b"/>
+          <a:lstStyle/>
+          <a:p>
+            <a:pPr algn="ctr"/>
+            <a:r>
+              <a:rPr lang="en-US" dirty="0">
+                <a:ln>
+                  <a:noFill/>
+                  <a:prstDash val="dash"/>
+                </a:ln>
+                <a:solidFill>
+                  <a:schemeClr val="tx1"/>
+                </a:solidFill>
+              </a:rPr>
+              <a:t>Web </a:t>
+            </a:r>
+          </a:p>
+          <a:p>
+            <a:pPr algn="ctr"/>
+            <a:r>
+              <a:rPr lang="en-US" dirty="0">
+                <a:ln>
+                  <a:noFill/>
+                  <a:prstDash val="dash"/>
+                </a:ln>
+                <a:solidFill>
+                  <a:schemeClr val="tx1"/>
+                </a:solidFill>
+              </a:rPr>
+              <a:t>Query</a:t>
+            </a:r>
+          </a:p>
+        </p:txBody>
+      </p:sp>
+      <p:sp>
+        <p:nvSpPr>
+          <p:cNvPr id="13" name="Flowchart: Process 12">
+            <a:extLst>
+              <a:ext uri="{FF2B5EF4-FFF2-40B4-BE49-F238E27FC236}">
+                <a16:creationId xmlns:a16="http://schemas.microsoft.com/office/drawing/2014/main" id="{4BB5720A-82C5-4BD5-B7FF-33485E19896E}"/>
+              </a:ext>
+            </a:extLst>
+          </p:cNvPr>
+          <p:cNvSpPr/>
+          <p:nvPr/>
+        </p:nvSpPr>
+        <p:spPr>
+          <a:xfrm>
+            <a:off x="4595120" y="1003466"/>
+            <a:ext cx="1068940" cy="5044910"/>
+          </a:xfrm>
+          <a:prstGeom prst="flowChartProcess">
+            <a:avLst/>
+          </a:prstGeom>
+          <a:noFill/>
+          <a:ln>
+            <a:prstDash val="dash"/>
+          </a:ln>
+        </p:spPr>
+        <p:style>
+          <a:lnRef idx="2">
+            <a:schemeClr val="accent1">
+              <a:shade val="50000"/>
+            </a:schemeClr>
+          </a:lnRef>
+          <a:fillRef idx="1">
+            <a:schemeClr val="accent1"/>
+          </a:fillRef>
+          <a:effectRef idx="0">
+            <a:schemeClr val="accent1"/>
+          </a:effectRef>
+          <a:fontRef idx="minor">
+            <a:schemeClr val="lt1"/>
+          </a:fontRef>
+        </p:style>
+        <p:txBody>
+          <a:bodyPr rtlCol="0" anchor="b"/>
+          <a:lstStyle/>
+          <a:p>
+            <a:pPr algn="ctr"/>
+            <a:r>
+              <a:rPr lang="en-US" dirty="0">
+                <a:ln>
+                  <a:noFill/>
+                  <a:prstDash val="dash"/>
+                </a:ln>
+                <a:solidFill>
+                  <a:schemeClr val="tx1"/>
+                </a:solidFill>
+              </a:rPr>
+              <a:t>Results Parsing</a:t>
+            </a:r>
+          </a:p>
+        </p:txBody>
+      </p:sp>
+      <p:sp>
+        <p:nvSpPr>
+          <p:cNvPr id="4" name="Flowchart: Alternate Process 3">
+            <a:extLst>
+              <a:ext uri="{FF2B5EF4-FFF2-40B4-BE49-F238E27FC236}">
+                <a16:creationId xmlns:a16="http://schemas.microsoft.com/office/drawing/2014/main" id="{07BABCFB-18DF-409E-8686-0DCF8CF0926D}"/>
+              </a:ext>
+            </a:extLst>
+          </p:cNvPr>
+          <p:cNvSpPr/>
+          <p:nvPr/>
+        </p:nvSpPr>
+        <p:spPr>
+          <a:xfrm>
+            <a:off x="899704" y="1362667"/>
             <a:ext cx="1741394" cy="450476"/>
           </a:xfrm>
           <a:prstGeom prst="flowChartAlternateProcess">
@@ -3694,6 +4100,12 @@
           <a:prstGeom prst="flowChartProcess">
             <a:avLst/>
           </a:prstGeom>
+          <a:solidFill>
+            <a:schemeClr val="accent5">
+              <a:lumMod val="40000"/>
+              <a:lumOff val="60000"/>
+            </a:schemeClr>
+          </a:solidFill>
         </p:spPr>
         <p:style>
           <a:lnRef idx="2">
@@ -3717,7 +4129,11 @@
           <a:p>
             <a:pPr algn="ctr"/>
             <a:r>
-              <a:rPr lang="en-US" dirty="0"/>
+              <a:rPr lang="en-US" dirty="0">
+                <a:solidFill>
+                  <a:schemeClr val="tx1"/>
+                </a:solidFill>
+              </a:rPr>
               <a:t>Exo Manager</a:t>
             </a:r>
           </a:p>
@@ -3737,7 +4153,7 @@
         </p:nvSpPr>
         <p:spPr>
           <a:xfrm>
-            <a:off x="1071661" y="2523465"/>
+            <a:off x="899704" y="2506221"/>
             <a:ext cx="1741394" cy="450476"/>
           </a:xfrm>
           <a:prstGeom prst="flowChartAlternateProcess">
@@ -3786,7 +4202,7 @@
         </p:nvSpPr>
         <p:spPr>
           <a:xfrm>
-            <a:off x="1071661" y="3688208"/>
+            <a:off x="899704" y="3670964"/>
             <a:ext cx="1741394" cy="450476"/>
           </a:xfrm>
           <a:prstGeom prst="flowChartAlternateProcess">
@@ -3835,7 +4251,7 @@
         </p:nvSpPr>
         <p:spPr>
           <a:xfrm>
-            <a:off x="1071661" y="4918935"/>
+            <a:off x="899704" y="4901691"/>
             <a:ext cx="1741394" cy="450476"/>
           </a:xfrm>
           <a:prstGeom prst="flowChartAlternateProcess">
@@ -3865,17 +4281,17 @@
             <a:pPr algn="ctr"/>
             <a:r>
               <a:rPr lang="en-US" dirty="0"/>
-              <a:t>EPDB</a:t>
-            </a:r>
-          </a:p>
-        </p:txBody>
-      </p:sp>
-      <p:sp>
-        <p:nvSpPr>
-          <p:cNvPr id="12" name="Flowchart: Process 11">
-            <a:extLst>
-              <a:ext uri="{FF2B5EF4-FFF2-40B4-BE49-F238E27FC236}">
-                <a16:creationId xmlns:a16="http://schemas.microsoft.com/office/drawing/2014/main" id="{454C3317-54A0-4A97-9DC2-AF6421FE5B42}"/>
+              <a:t>Exo Planet DB</a:t>
+            </a:r>
+          </a:p>
+        </p:txBody>
+      </p:sp>
+      <p:sp>
+        <p:nvSpPr>
+          <p:cNvPr id="14" name="Flowchart: Process 13">
+            <a:extLst>
+              <a:ext uri="{FF2B5EF4-FFF2-40B4-BE49-F238E27FC236}">
+                <a16:creationId xmlns:a16="http://schemas.microsoft.com/office/drawing/2014/main" id="{62F28DA4-4130-4E8E-87C5-5B279AF69ED2}"/>
               </a:ext>
             </a:extLst>
           </p:cNvPr>
@@ -3884,16 +4300,18 @@
         </p:nvSpPr>
         <p:spPr>
           <a:xfrm>
-            <a:off x="3509160" y="1003466"/>
-            <a:ext cx="926640" cy="4726380"/>
+            <a:off x="6149444" y="988249"/>
+            <a:ext cx="1145969" cy="4711213"/>
           </a:xfrm>
           <a:prstGeom prst="flowChartProcess">
             <a:avLst/>
           </a:prstGeom>
-          <a:noFill/>
-          <a:ln>
-            <a:prstDash val="dash"/>
-          </a:ln>
+          <a:solidFill>
+            <a:schemeClr val="accent5">
+              <a:lumMod val="40000"/>
+              <a:lumOff val="60000"/>
+            </a:schemeClr>
+          </a:solidFill>
         </p:spPr>
         <p:style>
           <a:lnRef idx="2">
@@ -3918,40 +4336,32 @@
             <a:pPr algn="ctr"/>
             <a:r>
               <a:rPr lang="en-US" dirty="0">
-                <a:ln>
-                  <a:noFill/>
-                  <a:prstDash val="dash"/>
-                </a:ln>
                 <a:solidFill>
                   <a:schemeClr val="tx1"/>
                 </a:solidFill>
               </a:rPr>
-              <a:t>Web </a:t>
+              <a:t>SDB Generator</a:t>
             </a:r>
           </a:p>
           <a:p>
             <a:pPr algn="ctr"/>
             <a:r>
               <a:rPr lang="en-US" dirty="0">
-                <a:ln>
-                  <a:noFill/>
-                  <a:prstDash val="dash"/>
-                </a:ln>
                 <a:solidFill>
                   <a:schemeClr val="tx1"/>
                 </a:solidFill>
               </a:rPr>
-              <a:t>Query</a:t>
-            </a:r>
-          </a:p>
-        </p:txBody>
-      </p:sp>
-      <p:sp>
-        <p:nvSpPr>
-          <p:cNvPr id="13" name="Flowchart: Process 12">
-            <a:extLst>
-              <a:ext uri="{FF2B5EF4-FFF2-40B4-BE49-F238E27FC236}">
-                <a16:creationId xmlns:a16="http://schemas.microsoft.com/office/drawing/2014/main" id="{4BB5720A-82C5-4BD5-B7FF-33485E19896E}"/>
+              <a:t>(xml)</a:t>
+            </a:r>
+          </a:p>
+        </p:txBody>
+      </p:sp>
+      <p:sp>
+        <p:nvSpPr>
+          <p:cNvPr id="15" name="Flowchart: Alternate Process 14">
+            <a:extLst>
+              <a:ext uri="{FF2B5EF4-FFF2-40B4-BE49-F238E27FC236}">
+                <a16:creationId xmlns:a16="http://schemas.microsoft.com/office/drawing/2014/main" id="{867E03E8-31CA-470D-BAB7-F11DD786A333}"/>
               </a:ext>
             </a:extLst>
           </p:cNvPr>
@@ -3960,125 +4370,8 @@
         </p:nvSpPr>
         <p:spPr>
           <a:xfrm>
-            <a:off x="4595120" y="1003466"/>
-            <a:ext cx="1068940" cy="4726380"/>
-          </a:xfrm>
-          <a:prstGeom prst="flowChartProcess">
-            <a:avLst/>
-          </a:prstGeom>
-          <a:noFill/>
-          <a:ln>
-            <a:prstDash val="dash"/>
-          </a:ln>
-        </p:spPr>
-        <p:style>
-          <a:lnRef idx="2">
-            <a:schemeClr val="accent1">
-              <a:shade val="50000"/>
-            </a:schemeClr>
-          </a:lnRef>
-          <a:fillRef idx="1">
-            <a:schemeClr val="accent1"/>
-          </a:fillRef>
-          <a:effectRef idx="0">
-            <a:schemeClr val="accent1"/>
-          </a:effectRef>
-          <a:fontRef idx="minor">
-            <a:schemeClr val="lt1"/>
-          </a:fontRef>
-        </p:style>
-        <p:txBody>
-          <a:bodyPr rtlCol="0" anchor="ctr"/>
-          <a:lstStyle/>
-          <a:p>
-            <a:pPr algn="ctr"/>
-            <a:r>
-              <a:rPr lang="en-US" dirty="0">
-                <a:ln>
-                  <a:noFill/>
-                  <a:prstDash val="dash"/>
-                </a:ln>
-                <a:solidFill>
-                  <a:schemeClr val="tx1"/>
-                </a:solidFill>
-              </a:rPr>
-              <a:t>Results Parsing</a:t>
-            </a:r>
-          </a:p>
-        </p:txBody>
-      </p:sp>
-      <p:sp>
-        <p:nvSpPr>
-          <p:cNvPr id="14" name="Flowchart: Process 13">
-            <a:extLst>
-              <a:ext uri="{FF2B5EF4-FFF2-40B4-BE49-F238E27FC236}">
-                <a16:creationId xmlns:a16="http://schemas.microsoft.com/office/drawing/2014/main" id="{62F28DA4-4130-4E8E-87C5-5B279AF69ED2}"/>
-              </a:ext>
-            </a:extLst>
-          </p:cNvPr>
-          <p:cNvSpPr/>
-          <p:nvPr/>
-        </p:nvSpPr>
-        <p:spPr>
-          <a:xfrm>
-            <a:off x="6149445" y="988250"/>
-            <a:ext cx="1145969" cy="4711213"/>
-          </a:xfrm>
-          <a:prstGeom prst="flowChartProcess">
-            <a:avLst/>
-          </a:prstGeom>
-        </p:spPr>
-        <p:style>
-          <a:lnRef idx="2">
-            <a:schemeClr val="accent1">
-              <a:shade val="50000"/>
-            </a:schemeClr>
-          </a:lnRef>
-          <a:fillRef idx="1">
-            <a:schemeClr val="accent1"/>
-          </a:fillRef>
-          <a:effectRef idx="0">
-            <a:schemeClr val="accent1"/>
-          </a:effectRef>
-          <a:fontRef idx="minor">
-            <a:schemeClr val="lt1"/>
-          </a:fontRef>
-        </p:style>
-        <p:txBody>
-          <a:bodyPr rtlCol="0" anchor="ctr"/>
-          <a:lstStyle/>
-          <a:p>
-            <a:pPr algn="ctr"/>
-            <a:r>
-              <a:rPr lang="en-US" dirty="0"/>
-              <a:t>SDB Generator</a:t>
-            </a:r>
-          </a:p>
-          <a:p>
-            <a:pPr algn="ctr"/>
-            <a:r>
-              <a:rPr lang="en-US" dirty="0"/>
-              <a:t>(XML)</a:t>
-            </a:r>
-          </a:p>
-        </p:txBody>
-      </p:sp>
-      <p:sp>
-        <p:nvSpPr>
-          <p:cNvPr id="15" name="Flowchart: Alternate Process 14">
-            <a:extLst>
-              <a:ext uri="{FF2B5EF4-FFF2-40B4-BE49-F238E27FC236}">
-                <a16:creationId xmlns:a16="http://schemas.microsoft.com/office/drawing/2014/main" id="{867E03E8-31CA-470D-BAB7-F11DD786A333}"/>
-              </a:ext>
-            </a:extLst>
-          </p:cNvPr>
-          <p:cNvSpPr/>
-          <p:nvPr/>
-        </p:nvSpPr>
-        <p:spPr>
-          <a:xfrm>
-            <a:off x="9926774" y="1442872"/>
-            <a:ext cx="1741394" cy="3972256"/>
+            <a:off x="9791700" y="1442872"/>
+            <a:ext cx="1876468" cy="3972256"/>
           </a:xfrm>
           <a:prstGeom prst="flowChartAlternateProcess">
             <a:avLst/>
@@ -4115,7 +4408,7 @@
             <a:pPr algn="ctr"/>
             <a:r>
               <a:rPr lang="en-US" dirty="0"/>
-              <a:t>Database</a:t>
+              <a:t>Sky Database</a:t>
             </a:r>
           </a:p>
         </p:txBody>
@@ -4134,8 +4427,8 @@
         </p:nvSpPr>
         <p:spPr>
           <a:xfrm>
-            <a:off x="2916370" y="1506144"/>
-            <a:ext cx="486493" cy="162650"/>
+            <a:off x="2779844" y="1506143"/>
+            <a:ext cx="623019" cy="166919"/>
           </a:xfrm>
           <a:prstGeom prst="leftRightArrow">
             <a:avLst/>
@@ -4180,8 +4473,8 @@
         </p:nvSpPr>
         <p:spPr>
           <a:xfrm>
-            <a:off x="2916370" y="2650134"/>
-            <a:ext cx="486493" cy="162650"/>
+            <a:off x="2779844" y="2650133"/>
+            <a:ext cx="623019" cy="166919"/>
           </a:xfrm>
           <a:prstGeom prst="leftRightArrow">
             <a:avLst/>
@@ -4226,8 +4519,8 @@
         </p:nvSpPr>
         <p:spPr>
           <a:xfrm>
-            <a:off x="2936944" y="3847869"/>
-            <a:ext cx="486493" cy="162650"/>
+            <a:off x="2800418" y="3847868"/>
+            <a:ext cx="623019" cy="166919"/>
           </a:xfrm>
           <a:prstGeom prst="leftRightArrow">
             <a:avLst/>
@@ -4272,8 +4565,8 @@
         </p:nvSpPr>
         <p:spPr>
           <a:xfrm>
-            <a:off x="2916371" y="5045604"/>
-            <a:ext cx="486493" cy="162650"/>
+            <a:off x="2779845" y="5045603"/>
+            <a:ext cx="623019" cy="166919"/>
           </a:xfrm>
           <a:prstGeom prst="leftRightArrow">
             <a:avLst/>
@@ -4323,7 +4616,7 @@
         <p:spPr>
           <a:xfrm>
             <a:off x="5666003" y="1587469"/>
-            <a:ext cx="483442" cy="1756388"/>
+            <a:ext cx="483441" cy="1756387"/>
           </a:xfrm>
           <a:prstGeom prst="bentConnector3">
             <a:avLst>
@@ -4368,7 +4661,7 @@
         <p:spPr>
           <a:xfrm>
             <a:off x="5666004" y="2731459"/>
-            <a:ext cx="483441" cy="612398"/>
+            <a:ext cx="483440" cy="612397"/>
           </a:xfrm>
           <a:prstGeom prst="bentConnector3">
             <a:avLst>
@@ -4412,8 +4705,8 @@
         </p:nvCxnSpPr>
         <p:spPr>
           <a:xfrm flipV="1">
-            <a:off x="5666004" y="3343857"/>
-            <a:ext cx="483441" cy="585337"/>
+            <a:off x="5666004" y="3343856"/>
+            <a:ext cx="483440" cy="585338"/>
           </a:xfrm>
           <a:prstGeom prst="bentConnector3">
             <a:avLst>
@@ -4457,8 +4750,8 @@
         </p:nvCxnSpPr>
         <p:spPr>
           <a:xfrm flipV="1">
-            <a:off x="5664061" y="3343857"/>
-            <a:ext cx="485384" cy="1783072"/>
+            <a:off x="5664061" y="3343856"/>
+            <a:ext cx="485383" cy="1783073"/>
           </a:xfrm>
           <a:prstGeom prst="bentConnector3">
             <a:avLst>
@@ -4557,6 +4850,12 @@
           <a:prstGeom prst="flowChartProcess">
             <a:avLst/>
           </a:prstGeom>
+          <a:solidFill>
+            <a:schemeClr val="accent5">
+              <a:lumMod val="40000"/>
+              <a:lumOff val="60000"/>
+            </a:schemeClr>
+          </a:solidFill>
         </p:spPr>
         <p:style>
           <a:lnRef idx="2">
@@ -4580,12 +4879,23 @@
           <a:p>
             <a:pPr algn="ctr"/>
             <a:r>
-              <a:rPr lang="en-US"/>
-              <a:t>Text </a:t>
-            </a:r>
-            <a:r>
-              <a:rPr lang="en-US" dirty="0"/>
-              <a:t>Converter</a:t>
+              <a:rPr lang="en-US" dirty="0">
+                <a:solidFill>
+                  <a:schemeClr val="tx1"/>
+                </a:solidFill>
+              </a:rPr>
+              <a:t>XML Converter</a:t>
+            </a:r>
+          </a:p>
+          <a:p>
+            <a:pPr algn="ctr"/>
+            <a:r>
+              <a:rPr lang="en-US" dirty="0">
+                <a:solidFill>
+                  <a:schemeClr val="tx1"/>
+                </a:solidFill>
+              </a:rPr>
+              <a:t>(txt)</a:t>
             </a:r>
           </a:p>
         </p:txBody>
@@ -4660,9 +4970,9 @@
           <p:nvPr/>
         </p:nvCxnSpPr>
         <p:spPr>
-          <a:xfrm flipV="1">
-            <a:off x="7295414" y="3343856"/>
-            <a:ext cx="210039" cy="1"/>
+          <a:xfrm>
+            <a:off x="7295413" y="3343856"/>
+            <a:ext cx="210040" cy="12700"/>
           </a:xfrm>
           <a:prstGeom prst="bentConnector3">
             <a:avLst/>
@@ -4686,10 +4996,247 @@
           </a:fontRef>
         </p:style>
       </p:cxnSp>
+      <p:sp>
+        <p:nvSpPr>
+          <p:cNvPr id="42" name="Flowchart: Process 41">
+            <a:extLst>
+              <a:ext uri="{FF2B5EF4-FFF2-40B4-BE49-F238E27FC236}">
+                <a16:creationId xmlns:a16="http://schemas.microsoft.com/office/drawing/2014/main" id="{51C8D325-32C1-450F-82DC-46377341B5EC}"/>
+              </a:ext>
+            </a:extLst>
+          </p:cNvPr>
+          <p:cNvSpPr/>
+          <p:nvPr/>
+        </p:nvSpPr>
+        <p:spPr>
+          <a:xfrm>
+            <a:off x="3507214" y="1356230"/>
+            <a:ext cx="2156845" cy="450476"/>
+          </a:xfrm>
+          <a:prstGeom prst="flowChartProcess">
+            <a:avLst/>
+          </a:prstGeom>
+          <a:solidFill>
+            <a:schemeClr val="accent5">
+              <a:lumMod val="40000"/>
+              <a:lumOff val="60000"/>
+            </a:schemeClr>
+          </a:solidFill>
+        </p:spPr>
+        <p:style>
+          <a:lnRef idx="2">
+            <a:schemeClr val="accent1">
+              <a:shade val="50000"/>
+            </a:schemeClr>
+          </a:lnRef>
+          <a:fillRef idx="1">
+            <a:schemeClr val="accent1"/>
+          </a:fillRef>
+          <a:effectRef idx="0">
+            <a:schemeClr val="accent1"/>
+          </a:effectRef>
+          <a:fontRef idx="minor">
+            <a:schemeClr val="lt1"/>
+          </a:fontRef>
+        </p:style>
+        <p:txBody>
+          <a:bodyPr rtlCol="0" anchor="ctr"/>
+          <a:lstStyle/>
+          <a:p>
+            <a:pPr algn="ctr"/>
+            <a:r>
+              <a:rPr lang="en-US" dirty="0">
+                <a:solidFill>
+                  <a:schemeClr val="tx1"/>
+                </a:solidFill>
+              </a:rPr>
+              <a:t>TNS Manager</a:t>
+            </a:r>
+          </a:p>
+        </p:txBody>
+      </p:sp>
+      <p:sp>
+        <p:nvSpPr>
+          <p:cNvPr id="43" name="Flowchart: Process 42">
+            <a:extLst>
+              <a:ext uri="{FF2B5EF4-FFF2-40B4-BE49-F238E27FC236}">
+                <a16:creationId xmlns:a16="http://schemas.microsoft.com/office/drawing/2014/main" id="{F112E7D8-CA3F-4099-A4CD-1F2D57049DE4}"/>
+              </a:ext>
+            </a:extLst>
+          </p:cNvPr>
+          <p:cNvSpPr/>
+          <p:nvPr/>
+        </p:nvSpPr>
+        <p:spPr>
+          <a:xfrm>
+            <a:off x="3507215" y="2500220"/>
+            <a:ext cx="2156845" cy="450476"/>
+          </a:xfrm>
+          <a:prstGeom prst="flowChartProcess">
+            <a:avLst/>
+          </a:prstGeom>
+          <a:solidFill>
+            <a:schemeClr val="accent5">
+              <a:lumMod val="40000"/>
+              <a:lumOff val="60000"/>
+            </a:schemeClr>
+          </a:solidFill>
+        </p:spPr>
+        <p:style>
+          <a:lnRef idx="2">
+            <a:schemeClr val="accent1">
+              <a:shade val="50000"/>
+            </a:schemeClr>
+          </a:lnRef>
+          <a:fillRef idx="1">
+            <a:schemeClr val="accent1"/>
+          </a:fillRef>
+          <a:effectRef idx="0">
+            <a:schemeClr val="accent1"/>
+          </a:effectRef>
+          <a:fontRef idx="minor">
+            <a:schemeClr val="lt1"/>
+          </a:fontRef>
+        </p:style>
+        <p:txBody>
+          <a:bodyPr rtlCol="0" anchor="ctr"/>
+          <a:lstStyle/>
+          <a:p>
+            <a:pPr algn="ctr"/>
+            <a:r>
+              <a:rPr lang="en-US" dirty="0">
+                <a:solidFill>
+                  <a:schemeClr val="tx1"/>
+                </a:solidFill>
+              </a:rPr>
+              <a:t>VSX Manager</a:t>
+            </a:r>
+          </a:p>
+        </p:txBody>
+      </p:sp>
+      <p:sp>
+        <p:nvSpPr>
+          <p:cNvPr id="44" name="Flowchart: Process 43">
+            <a:extLst>
+              <a:ext uri="{FF2B5EF4-FFF2-40B4-BE49-F238E27FC236}">
+                <a16:creationId xmlns:a16="http://schemas.microsoft.com/office/drawing/2014/main" id="{A54C32DD-9C13-467E-8869-47857F13E10F}"/>
+              </a:ext>
+            </a:extLst>
+          </p:cNvPr>
+          <p:cNvSpPr/>
+          <p:nvPr/>
+        </p:nvSpPr>
+        <p:spPr>
+          <a:xfrm>
+            <a:off x="3507216" y="3697955"/>
+            <a:ext cx="2156844" cy="450476"/>
+          </a:xfrm>
+          <a:prstGeom prst="flowChartProcess">
+            <a:avLst/>
+          </a:prstGeom>
+          <a:solidFill>
+            <a:schemeClr val="accent5">
+              <a:lumMod val="40000"/>
+              <a:lumOff val="60000"/>
+            </a:schemeClr>
+          </a:solidFill>
+        </p:spPr>
+        <p:style>
+          <a:lnRef idx="2">
+            <a:schemeClr val="accent1">
+              <a:shade val="50000"/>
+            </a:schemeClr>
+          </a:lnRef>
+          <a:fillRef idx="1">
+            <a:schemeClr val="accent1"/>
+          </a:fillRef>
+          <a:effectRef idx="0">
+            <a:schemeClr val="accent1"/>
+          </a:effectRef>
+          <a:fontRef idx="minor">
+            <a:schemeClr val="lt1"/>
+          </a:fontRef>
+        </p:style>
+        <p:txBody>
+          <a:bodyPr rtlCol="0" anchor="ctr"/>
+          <a:lstStyle/>
+          <a:p>
+            <a:pPr algn="ctr"/>
+            <a:r>
+              <a:rPr lang="en-US" dirty="0">
+                <a:solidFill>
+                  <a:schemeClr val="tx1"/>
+                </a:solidFill>
+              </a:rPr>
+              <a:t>MPC Manager</a:t>
+            </a:r>
+          </a:p>
+        </p:txBody>
+      </p:sp>
     </p:spTree>
     <p:extLst>
       <p:ext uri="{BB962C8B-B14F-4D97-AF65-F5344CB8AC3E}">
         <p14:creationId xmlns:p14="http://schemas.microsoft.com/office/powerpoint/2010/main" val="2168399988"/>
+      </p:ext>
+    </p:extLst>
+  </p:cSld>
+  <p:clrMapOvr>
+    <a:masterClrMapping/>
+  </p:clrMapOvr>
+</p:sld>
+</file>
+
+<file path=ppt/slides/slide2.xml><?xml version="1.0" encoding="utf-8"?>
+<p:sld xmlns:a="http://schemas.openxmlformats.org/drawingml/2006/main" xmlns:r="http://schemas.openxmlformats.org/officeDocument/2006/relationships" xmlns:p="http://schemas.openxmlformats.org/presentationml/2006/main">
+  <p:cSld>
+    <p:spTree>
+      <p:nvGrpSpPr>
+        <p:cNvPr id="1" name=""/>
+        <p:cNvGrpSpPr/>
+        <p:nvPr/>
+      </p:nvGrpSpPr>
+      <p:grpSpPr>
+        <a:xfrm>
+          <a:off x="0" y="0"/>
+          <a:ext cx="0" cy="0"/>
+          <a:chOff x="0" y="0"/>
+          <a:chExt cx="0" cy="0"/>
+        </a:xfrm>
+      </p:grpSpPr>
+      <p:pic>
+        <p:nvPicPr>
+          <p:cNvPr id="7" name="Picture 6">
+            <a:extLst>
+              <a:ext uri="{FF2B5EF4-FFF2-40B4-BE49-F238E27FC236}">
+                <a16:creationId xmlns:a16="http://schemas.microsoft.com/office/drawing/2014/main" id="{7982BCF3-3518-4E4C-AEBF-B1F15687FDBE}"/>
+              </a:ext>
+            </a:extLst>
+          </p:cNvPr>
+          <p:cNvPicPr>
+            <a:picLocks noChangeAspect="1"/>
+          </p:cNvPicPr>
+          <p:nvPr/>
+        </p:nvPicPr>
+        <p:blipFill>
+          <a:blip r:embed="rId2"/>
+          <a:stretch>
+            <a:fillRect/>
+          </a:stretch>
+        </p:blipFill>
+        <p:spPr>
+          <a:xfrm>
+            <a:off x="1141737" y="1176999"/>
+            <a:ext cx="9563310" cy="4831864"/>
+          </a:xfrm>
+          <a:prstGeom prst="rect">
+            <a:avLst/>
+          </a:prstGeom>
+        </p:spPr>
+      </p:pic>
+    </p:spTree>
+    <p:extLst>
+      <p:ext uri="{BB962C8B-B14F-4D97-AF65-F5344CB8AC3E}">
+        <p14:creationId xmlns:p14="http://schemas.microsoft.com/office/powerpoint/2010/main" val="369419966"/>
       </p:ext>
     </p:extLst>
   </p:cSld>

</xml_diff>

<commit_message>
Added Scout NEO database search
</commit_message>
<xml_diff>
--- a/IPS.pptx
+++ b/IPS.pptx
@@ -116,7 +116,7 @@
 <file path=ppt/revisionInfo.xml><?xml version="1.0" encoding="utf-8"?>
 <p1510:revInfo xmlns:a="http://schemas.openxmlformats.org/drawingml/2006/main" xmlns:r="http://schemas.openxmlformats.org/officeDocument/2006/relationships" xmlns:p1510="http://schemas.microsoft.com/office/powerpoint/2015/10/main">
   <p1510:revLst>
-    <p1510:client id="{B5C1083E-39BF-411A-973B-3051B774A021}" v="3" dt="2021-04-28T14:27:00.845"/>
+    <p1510:client id="{99220E6D-63F4-4885-AF40-0CA2EFBA1016}" v="1" dt="2021-05-07T15:45:43.286"/>
   </p1510:revLst>
 </p1510:revInfo>
 </file>
@@ -530,6 +530,94 @@
       </pc:sldChg>
     </pc:docChg>
   </pc:docChgLst>
+  <pc:docChgLst>
+    <pc:chgData name="Rick McAlister" userId="fad37fcb1da1ebec" providerId="LiveId" clId="{99220E6D-63F4-4885-AF40-0CA2EFBA1016}"/>
+    <pc:docChg chg="custSel modSld">
+      <pc:chgData name="Rick McAlister" userId="fad37fcb1da1ebec" providerId="LiveId" clId="{99220E6D-63F4-4885-AF40-0CA2EFBA1016}" dt="2021-05-07T15:48:11.034" v="43" actId="11529"/>
+      <pc:docMkLst>
+        <pc:docMk/>
+      </pc:docMkLst>
+      <pc:sldChg chg="addSp delSp modSp mod">
+        <pc:chgData name="Rick McAlister" userId="fad37fcb1da1ebec" providerId="LiveId" clId="{99220E6D-63F4-4885-AF40-0CA2EFBA1016}" dt="2021-05-07T15:48:11.034" v="43" actId="11529"/>
+        <pc:sldMkLst>
+          <pc:docMk/>
+          <pc:sldMk cId="2168399988" sldId="256"/>
+        </pc:sldMkLst>
+        <pc:spChg chg="mod">
+          <ac:chgData name="Rick McAlister" userId="fad37fcb1da1ebec" providerId="LiveId" clId="{99220E6D-63F4-4885-AF40-0CA2EFBA1016}" dt="2021-05-07T15:45:36.080" v="1" actId="14100"/>
+          <ac:spMkLst>
+            <pc:docMk/>
+            <pc:sldMk cId="2168399988" sldId="256"/>
+            <ac:spMk id="14" creationId="{62F28DA4-4130-4E8E-87C5-5B279AF69ED2}"/>
+          </ac:spMkLst>
+        </pc:spChg>
+        <pc:spChg chg="add mod">
+          <ac:chgData name="Rick McAlister" userId="fad37fcb1da1ebec" providerId="LiveId" clId="{99220E6D-63F4-4885-AF40-0CA2EFBA1016}" dt="2021-05-07T15:47:11.033" v="32" actId="1076"/>
+          <ac:spMkLst>
+            <pc:docMk/>
+            <pc:sldMk cId="2168399988" sldId="256"/>
+            <ac:spMk id="39" creationId="{F49A1C26-4D20-495D-87E4-513779DD3129}"/>
+          </ac:spMkLst>
+        </pc:spChg>
+        <pc:cxnChg chg="mod">
+          <ac:chgData name="Rick McAlister" userId="fad37fcb1da1ebec" providerId="LiveId" clId="{99220E6D-63F4-4885-AF40-0CA2EFBA1016}" dt="2021-05-07T15:45:36.080" v="1" actId="14100"/>
+          <ac:cxnSpMkLst>
+            <pc:docMk/>
+            <pc:sldMk cId="2168399988" sldId="256"/>
+            <ac:cxnSpMk id="21" creationId="{236F8A7D-87B2-415B-9CE4-8D7D448F29F4}"/>
+          </ac:cxnSpMkLst>
+        </pc:cxnChg>
+        <pc:cxnChg chg="mod">
+          <ac:chgData name="Rick McAlister" userId="fad37fcb1da1ebec" providerId="LiveId" clId="{99220E6D-63F4-4885-AF40-0CA2EFBA1016}" dt="2021-05-07T15:45:36.080" v="1" actId="14100"/>
+          <ac:cxnSpMkLst>
+            <pc:docMk/>
+            <pc:sldMk cId="2168399988" sldId="256"/>
+            <ac:cxnSpMk id="23" creationId="{0F3C60FB-82A6-4FFB-8849-24B928563845}"/>
+          </ac:cxnSpMkLst>
+        </pc:cxnChg>
+        <pc:cxnChg chg="mod">
+          <ac:chgData name="Rick McAlister" userId="fad37fcb1da1ebec" providerId="LiveId" clId="{99220E6D-63F4-4885-AF40-0CA2EFBA1016}" dt="2021-05-07T15:45:36.080" v="1" actId="14100"/>
+          <ac:cxnSpMkLst>
+            <pc:docMk/>
+            <pc:sldMk cId="2168399988" sldId="256"/>
+            <ac:cxnSpMk id="24" creationId="{99CCB015-FB69-4328-8E38-1AA91717D512}"/>
+          </ac:cxnSpMkLst>
+        </pc:cxnChg>
+        <pc:cxnChg chg="mod">
+          <ac:chgData name="Rick McAlister" userId="fad37fcb1da1ebec" providerId="LiveId" clId="{99220E6D-63F4-4885-AF40-0CA2EFBA1016}" dt="2021-05-07T15:45:36.080" v="1" actId="14100"/>
+          <ac:cxnSpMkLst>
+            <pc:docMk/>
+            <pc:sldMk cId="2168399988" sldId="256"/>
+            <ac:cxnSpMk id="25" creationId="{5F15F49C-698E-4664-B014-2DFFBD33ED7E}"/>
+          </ac:cxnSpMkLst>
+        </pc:cxnChg>
+        <pc:cxnChg chg="add del mod">
+          <ac:chgData name="Rick McAlister" userId="fad37fcb1da1ebec" providerId="LiveId" clId="{99220E6D-63F4-4885-AF40-0CA2EFBA1016}" dt="2021-05-07T15:47:53.155" v="42" actId="478"/>
+          <ac:cxnSpMkLst>
+            <pc:docMk/>
+            <pc:sldMk cId="2168399988" sldId="256"/>
+            <ac:cxnSpMk id="33" creationId="{E0403AD0-C478-4C5C-8344-2A817348A52E}"/>
+          </ac:cxnSpMkLst>
+        </pc:cxnChg>
+        <pc:cxnChg chg="add">
+          <ac:chgData name="Rick McAlister" userId="fad37fcb1da1ebec" providerId="LiveId" clId="{99220E6D-63F4-4885-AF40-0CA2EFBA1016}" dt="2021-05-07T15:48:11.034" v="43" actId="11529"/>
+          <ac:cxnSpMkLst>
+            <pc:docMk/>
+            <pc:sldMk cId="2168399988" sldId="256"/>
+            <ac:cxnSpMk id="41" creationId="{3A819193-7045-46A3-9462-9C6B4DABC48F}"/>
+          </ac:cxnSpMkLst>
+        </pc:cxnChg>
+        <pc:cxnChg chg="mod">
+          <ac:chgData name="Rick McAlister" userId="fad37fcb1da1ebec" providerId="LiveId" clId="{99220E6D-63F4-4885-AF40-0CA2EFBA1016}" dt="2021-05-07T15:45:36.080" v="1" actId="14100"/>
+          <ac:cxnSpMkLst>
+            <pc:docMk/>
+            <pc:sldMk cId="2168399988" sldId="256"/>
+            <ac:cxnSpMk id="57" creationId="{058F2672-A561-4023-8651-727A9487D9A9}"/>
+          </ac:cxnSpMkLst>
+        </pc:cxnChg>
+      </pc:sldChg>
+    </pc:docChg>
+  </pc:docChgLst>
 </pc:chgInfo>
 </file>
 
@@ -680,7 +768,7 @@
           <a:p>
             <a:fld id="{F3FFCF3C-4A0D-4637-8D0F-A75E6B068A0D}" type="datetimeFigureOut">
               <a:rPr lang="en-US" smtClean="0"/>
-              <a:t>4/28/2021</a:t>
+              <a:t>5/7/2021</a:t>
             </a:fld>
             <a:endParaRPr lang="en-US"/>
           </a:p>
@@ -878,7 +966,7 @@
           <a:p>
             <a:fld id="{F3FFCF3C-4A0D-4637-8D0F-A75E6B068A0D}" type="datetimeFigureOut">
               <a:rPr lang="en-US" smtClean="0"/>
-              <a:t>4/28/2021</a:t>
+              <a:t>5/7/2021</a:t>
             </a:fld>
             <a:endParaRPr lang="en-US"/>
           </a:p>
@@ -1086,7 +1174,7 @@
           <a:p>
             <a:fld id="{F3FFCF3C-4A0D-4637-8D0F-A75E6B068A0D}" type="datetimeFigureOut">
               <a:rPr lang="en-US" smtClean="0"/>
-              <a:t>4/28/2021</a:t>
+              <a:t>5/7/2021</a:t>
             </a:fld>
             <a:endParaRPr lang="en-US"/>
           </a:p>
@@ -1284,7 +1372,7 @@
           <a:p>
             <a:fld id="{F3FFCF3C-4A0D-4637-8D0F-A75E6B068A0D}" type="datetimeFigureOut">
               <a:rPr lang="en-US" smtClean="0"/>
-              <a:t>4/28/2021</a:t>
+              <a:t>5/7/2021</a:t>
             </a:fld>
             <a:endParaRPr lang="en-US"/>
           </a:p>
@@ -1559,7 +1647,7 @@
           <a:p>
             <a:fld id="{F3FFCF3C-4A0D-4637-8D0F-A75E6B068A0D}" type="datetimeFigureOut">
               <a:rPr lang="en-US" smtClean="0"/>
-              <a:t>4/28/2021</a:t>
+              <a:t>5/7/2021</a:t>
             </a:fld>
             <a:endParaRPr lang="en-US"/>
           </a:p>
@@ -1824,7 +1912,7 @@
           <a:p>
             <a:fld id="{F3FFCF3C-4A0D-4637-8D0F-A75E6B068A0D}" type="datetimeFigureOut">
               <a:rPr lang="en-US" smtClean="0"/>
-              <a:t>4/28/2021</a:t>
+              <a:t>5/7/2021</a:t>
             </a:fld>
             <a:endParaRPr lang="en-US"/>
           </a:p>
@@ -2236,7 +2324,7 @@
           <a:p>
             <a:fld id="{F3FFCF3C-4A0D-4637-8D0F-A75E6B068A0D}" type="datetimeFigureOut">
               <a:rPr lang="en-US" smtClean="0"/>
-              <a:t>4/28/2021</a:t>
+              <a:t>5/7/2021</a:t>
             </a:fld>
             <a:endParaRPr lang="en-US"/>
           </a:p>
@@ -2377,7 +2465,7 @@
           <a:p>
             <a:fld id="{F3FFCF3C-4A0D-4637-8D0F-A75E6B068A0D}" type="datetimeFigureOut">
               <a:rPr lang="en-US" smtClean="0"/>
-              <a:t>4/28/2021</a:t>
+              <a:t>5/7/2021</a:t>
             </a:fld>
             <a:endParaRPr lang="en-US"/>
           </a:p>
@@ -2490,7 +2578,7 @@
           <a:p>
             <a:fld id="{F3FFCF3C-4A0D-4637-8D0F-A75E6B068A0D}" type="datetimeFigureOut">
               <a:rPr lang="en-US" smtClean="0"/>
-              <a:t>4/28/2021</a:t>
+              <a:t>5/7/2021</a:t>
             </a:fld>
             <a:endParaRPr lang="en-US"/>
           </a:p>
@@ -2801,7 +2889,7 @@
           <a:p>
             <a:fld id="{F3FFCF3C-4A0D-4637-8D0F-A75E6B068A0D}" type="datetimeFigureOut">
               <a:rPr lang="en-US" smtClean="0"/>
-              <a:t>4/28/2021</a:t>
+              <a:t>5/7/2021</a:t>
             </a:fld>
             <a:endParaRPr lang="en-US"/>
           </a:p>
@@ -3089,7 +3177,7 @@
           <a:p>
             <a:fld id="{F3FFCF3C-4A0D-4637-8D0F-A75E6B068A0D}" type="datetimeFigureOut">
               <a:rPr lang="en-US" smtClean="0"/>
-              <a:t>4/28/2021</a:t>
+              <a:t>5/7/2021</a:t>
             </a:fld>
             <a:endParaRPr lang="en-US"/>
           </a:p>
@@ -3330,7 +3418,7 @@
           <a:p>
             <a:fld id="{F3FFCF3C-4A0D-4637-8D0F-A75E6B068A0D}" type="datetimeFigureOut">
               <a:rPr lang="en-US" smtClean="0"/>
-              <a:t>4/28/2021</a:t>
+              <a:t>5/7/2021</a:t>
             </a:fld>
             <a:endParaRPr lang="en-US"/>
           </a:p>
@@ -4300,8 +4388,8 @@
         </p:nvSpPr>
         <p:spPr>
           <a:xfrm>
-            <a:off x="6149444" y="988249"/>
-            <a:ext cx="1145969" cy="4711213"/>
+            <a:off x="6149444" y="988250"/>
+            <a:ext cx="1145969" cy="3589688"/>
           </a:xfrm>
           <a:prstGeom prst="flowChartProcess">
             <a:avLst/>
@@ -4616,7 +4704,7 @@
         <p:spPr>
           <a:xfrm>
             <a:off x="5666003" y="1587469"/>
-            <a:ext cx="483441" cy="1756387"/>
+            <a:ext cx="483441" cy="1195625"/>
           </a:xfrm>
           <a:prstGeom prst="bentConnector3">
             <a:avLst>
@@ -4661,7 +4749,7 @@
         <p:spPr>
           <a:xfrm>
             <a:off x="5666004" y="2731459"/>
-            <a:ext cx="483440" cy="612397"/>
+            <a:ext cx="483440" cy="51635"/>
           </a:xfrm>
           <a:prstGeom prst="bentConnector3">
             <a:avLst>
@@ -4705,8 +4793,8 @@
         </p:nvCxnSpPr>
         <p:spPr>
           <a:xfrm flipV="1">
-            <a:off x="5666004" y="3343856"/>
-            <a:ext cx="483440" cy="585338"/>
+            <a:off x="5666004" y="2783094"/>
+            <a:ext cx="483440" cy="1146100"/>
           </a:xfrm>
           <a:prstGeom prst="bentConnector3">
             <a:avLst>
@@ -4750,8 +4838,8 @@
         </p:nvCxnSpPr>
         <p:spPr>
           <a:xfrm flipV="1">
-            <a:off x="5664061" y="3343856"/>
-            <a:ext cx="485383" cy="1783073"/>
+            <a:off x="5664061" y="2783094"/>
+            <a:ext cx="485383" cy="2343835"/>
           </a:xfrm>
           <a:prstGeom prst="bentConnector3">
             <a:avLst>
@@ -4971,8 +5059,8 @@
         </p:nvCxnSpPr>
         <p:spPr>
           <a:xfrm>
-            <a:off x="7295413" y="3343856"/>
-            <a:ext cx="210040" cy="12700"/>
+            <a:off x="7295413" y="2783094"/>
+            <a:ext cx="210040" cy="560762"/>
           </a:xfrm>
           <a:prstGeom prst="bentConnector3">
             <a:avLst/>
@@ -5173,6 +5261,118 @@
           </a:p>
         </p:txBody>
       </p:sp>
+      <p:sp>
+        <p:nvSpPr>
+          <p:cNvPr id="39" name="Flowchart: Process 38">
+            <a:extLst>
+              <a:ext uri="{FF2B5EF4-FFF2-40B4-BE49-F238E27FC236}">
+                <a16:creationId xmlns:a16="http://schemas.microsoft.com/office/drawing/2014/main" id="{F49A1C26-4D20-495D-87E4-513779DD3129}"/>
+              </a:ext>
+            </a:extLst>
+          </p:cNvPr>
+          <p:cNvSpPr/>
+          <p:nvPr/>
+        </p:nvSpPr>
+        <p:spPr>
+          <a:xfrm>
+            <a:off x="6149444" y="4745540"/>
+            <a:ext cx="1145969" cy="1032383"/>
+          </a:xfrm>
+          <a:prstGeom prst="flowChartProcess">
+            <a:avLst/>
+          </a:prstGeom>
+          <a:solidFill>
+            <a:schemeClr val="accent5">
+              <a:lumMod val="40000"/>
+              <a:lumOff val="60000"/>
+            </a:schemeClr>
+          </a:solidFill>
+        </p:spPr>
+        <p:style>
+          <a:lnRef idx="2">
+            <a:schemeClr val="accent1">
+              <a:shade val="50000"/>
+            </a:schemeClr>
+          </a:lnRef>
+          <a:fillRef idx="1">
+            <a:schemeClr val="accent1"/>
+          </a:fillRef>
+          <a:effectRef idx="0">
+            <a:schemeClr val="accent1"/>
+          </a:effectRef>
+          <a:fontRef idx="minor">
+            <a:schemeClr val="lt1"/>
+          </a:fontRef>
+        </p:style>
+        <p:txBody>
+          <a:bodyPr rtlCol="0" anchor="ctr"/>
+          <a:lstStyle/>
+          <a:p>
+            <a:pPr algn="ctr"/>
+            <a:r>
+              <a:rPr lang="en-US" sz="1600" dirty="0">
+                <a:solidFill>
+                  <a:schemeClr val="tx1"/>
+                </a:solidFill>
+              </a:rPr>
+              <a:t>Ephemeris</a:t>
+            </a:r>
+          </a:p>
+          <a:p>
+            <a:pPr algn="ctr"/>
+            <a:r>
+              <a:rPr lang="en-US" sz="1600" dirty="0">
+                <a:solidFill>
+                  <a:schemeClr val="tx1"/>
+                </a:solidFill>
+              </a:rPr>
+              <a:t>Generator</a:t>
+            </a:r>
+          </a:p>
+        </p:txBody>
+      </p:sp>
+      <p:cxnSp>
+        <p:nvCxnSpPr>
+          <p:cNvPr id="41" name="Straight Arrow Connector 40">
+            <a:extLst>
+              <a:ext uri="{FF2B5EF4-FFF2-40B4-BE49-F238E27FC236}">
+                <a16:creationId xmlns:a16="http://schemas.microsoft.com/office/drawing/2014/main" id="{3A819193-7045-46A3-9462-9C6B4DABC48F}"/>
+              </a:ext>
+            </a:extLst>
+          </p:cNvPr>
+          <p:cNvCxnSpPr>
+            <a:endCxn id="39" idx="1"/>
+          </p:cNvCxnSpPr>
+          <p:nvPr/>
+        </p:nvCxnSpPr>
+        <p:spPr>
+          <a:xfrm flipV="1">
+            <a:off x="5664059" y="5261732"/>
+            <a:ext cx="485385" cy="4974"/>
+          </a:xfrm>
+          <a:prstGeom prst="straightConnector1">
+            <a:avLst/>
+          </a:prstGeom>
+          <a:ln>
+            <a:headEnd type="triangle"/>
+            <a:tailEnd type="triangle"/>
+          </a:ln>
+        </p:spPr>
+        <p:style>
+          <a:lnRef idx="1">
+            <a:schemeClr val="accent1"/>
+          </a:lnRef>
+          <a:fillRef idx="0">
+            <a:schemeClr val="accent1"/>
+          </a:fillRef>
+          <a:effectRef idx="0">
+            <a:schemeClr val="accent1"/>
+          </a:effectRef>
+          <a:fontRef idx="minor">
+            <a:schemeClr val="tx1"/>
+          </a:fontRef>
+        </p:style>
+      </p:cxnSp>
     </p:spTree>
     <p:extLst>
       <p:ext uri="{BB962C8B-B14F-4D97-AF65-F5344CB8AC3E}">

</xml_diff>